<commit_message>
Iniziata elaborazione della presentazione grafica del progetto.
</commit_message>
<xml_diff>
--- a/Presentazione_Grafica/Presentazione_Grafica.pptx
+++ b/Presentazione_Grafica/Presentazione_Grafica.pptx
@@ -8,6 +8,8 @@
     <p:sldId id="256" r:id="rId2"/>
     <p:sldId id="257" r:id="rId3"/>
     <p:sldId id="258" r:id="rId4"/>
+    <p:sldId id="260" r:id="rId5"/>
+    <p:sldId id="262" r:id="rId6"/>
   </p:sldIdLst>
   <p:sldSz cx="12192000" cy="6858000"/>
   <p:notesSz cx="6858000" cy="9144000"/>
@@ -3314,6 +3316,14 @@
 <file path=ppt/slides/slide1.xml><?xml version="1.0" encoding="utf-8"?>
 <p:sld xmlns:a="http://schemas.openxmlformats.org/drawingml/2006/main" xmlns:r="http://schemas.openxmlformats.org/officeDocument/2006/relationships" xmlns:p="http://schemas.openxmlformats.org/presentationml/2006/main">
   <p:cSld>
+    <p:bg>
+      <p:bgPr>
+        <a:solidFill>
+          <a:srgbClr val="0C0C0C"/>
+        </a:solidFill>
+        <a:effectLst/>
+      </p:bgPr>
+    </p:bg>
     <p:spTree>
       <p:nvGrpSpPr>
         <p:cNvPr id="1" name=""/>
@@ -3328,61 +3338,41 @@
           <a:chExt cx="0" cy="0"/>
         </a:xfrm>
       </p:grpSpPr>
-      <p:sp>
-        <p:nvSpPr>
-          <p:cNvPr id="2" name="Titolo 1">
-            <a:extLst>
-              <a:ext uri="{FF2B5EF4-FFF2-40B4-BE49-F238E27FC236}">
-                <a16:creationId xmlns:a16="http://schemas.microsoft.com/office/drawing/2014/main" id="{40BC139A-B365-5A6B-701A-3518EFBC0D49}"/>
-              </a:ext>
-            </a:extLst>
-          </p:cNvPr>
-          <p:cNvSpPr>
-            <a:spLocks noGrp="1"/>
-          </p:cNvSpPr>
-          <p:nvPr>
-            <p:ph type="ctrTitle"/>
-          </p:nvPr>
-        </p:nvSpPr>
-        <p:spPr/>
-        <p:txBody>
-          <a:bodyPr>
-            <a:normAutofit/>
-          </a:bodyPr>
-          <a:lstStyle/>
-          <a:p>
-            <a:r>
-              <a:rPr lang="it-IT" dirty="0"/>
-              <a:t>Presentazione progetto di gruppo</a:t>
-            </a:r>
-          </a:p>
-        </p:txBody>
-      </p:sp>
-      <p:sp>
-        <p:nvSpPr>
-          <p:cNvPr id="3" name="Sottotitolo 2">
-            <a:extLst>
-              <a:ext uri="{FF2B5EF4-FFF2-40B4-BE49-F238E27FC236}">
-                <a16:creationId xmlns:a16="http://schemas.microsoft.com/office/drawing/2014/main" id="{F8DEC423-CCFD-026B-EBD3-2A727ED411F1}"/>
-              </a:ext>
-            </a:extLst>
-          </p:cNvPr>
-          <p:cNvSpPr>
-            <a:spLocks noGrp="1"/>
-          </p:cNvSpPr>
-          <p:nvPr>
-            <p:ph type="subTitle" idx="1"/>
-          </p:nvPr>
-        </p:nvSpPr>
-        <p:spPr/>
-        <p:txBody>
-          <a:bodyPr/>
-          <a:lstStyle/>
-          <a:p>
-            <a:endParaRPr lang="it-IT" dirty="0"/>
-          </a:p>
-        </p:txBody>
-      </p:sp>
+      <p:pic>
+        <p:nvPicPr>
+          <p:cNvPr id="7" name="Immagine 6">
+            <a:extLst>
+              <a:ext uri="{FF2B5EF4-FFF2-40B4-BE49-F238E27FC236}">
+                <a16:creationId xmlns:a16="http://schemas.microsoft.com/office/drawing/2014/main" id="{AFB713C4-A89C-FC3B-0253-31B1B0579274}"/>
+              </a:ext>
+            </a:extLst>
+          </p:cNvPr>
+          <p:cNvPicPr>
+            <a:picLocks noChangeAspect="1"/>
+          </p:cNvPicPr>
+          <p:nvPr/>
+        </p:nvPicPr>
+        <p:blipFill rotWithShape="1">
+          <a:blip r:embed="rId2">
+            <a:extLst>
+              <a:ext uri="{28A0092B-C50C-407E-A947-70E740481C1C}">
+                <a14:useLocalDpi xmlns:a14="http://schemas.microsoft.com/office/drawing/2010/main" val="0"/>
+              </a:ext>
+            </a:extLst>
+          </a:blip>
+          <a:srcRect l="597" t="17500" r="28398" b="29038"/>
+          <a:stretch/>
+        </p:blipFill>
+        <p:spPr>
+          <a:xfrm>
+            <a:off x="250785" y="1232906"/>
+            <a:ext cx="11690430" cy="4577381"/>
+          </a:xfrm>
+          <a:prstGeom prst="rect">
+            <a:avLst/>
+          </a:prstGeom>
+        </p:spPr>
+      </p:pic>
     </p:spTree>
     <p:extLst>
       <p:ext uri="{BB962C8B-B14F-4D97-AF65-F5344CB8AC3E}">
@@ -3399,6 +3389,14 @@
 <file path=ppt/slides/slide2.xml><?xml version="1.0" encoding="utf-8"?>
 <p:sld xmlns:a="http://schemas.openxmlformats.org/drawingml/2006/main" xmlns:r="http://schemas.openxmlformats.org/officeDocument/2006/relationships" xmlns:p="http://schemas.openxmlformats.org/presentationml/2006/main">
   <p:cSld>
+    <p:bg>
+      <p:bgPr>
+        <a:solidFill>
+          <a:srgbClr val="0C0C0C"/>
+        </a:solidFill>
+        <a:effectLst/>
+      </p:bgPr>
+    </p:bg>
     <p:spTree>
       <p:nvGrpSpPr>
         <p:cNvPr id="1" name=""/>
@@ -3415,54 +3413,165 @@
       </p:grpSpPr>
       <p:sp>
         <p:nvSpPr>
-          <p:cNvPr id="2" name="Titolo 1">
-            <a:extLst>
-              <a:ext uri="{FF2B5EF4-FFF2-40B4-BE49-F238E27FC236}">
-                <a16:creationId xmlns:a16="http://schemas.microsoft.com/office/drawing/2014/main" id="{AA28B79A-321A-9569-4019-FA2C1272FF03}"/>
-              </a:ext>
-            </a:extLst>
-          </p:cNvPr>
-          <p:cNvSpPr>
-            <a:spLocks noGrp="1"/>
-          </p:cNvSpPr>
-          <p:nvPr>
-            <p:ph type="title"/>
-          </p:nvPr>
-        </p:nvSpPr>
-        <p:spPr/>
-        <p:txBody>
-          <a:bodyPr/>
-          <a:lstStyle/>
-          <a:p>
-            <a:endParaRPr lang="it-IT"/>
-          </a:p>
-        </p:txBody>
-      </p:sp>
-      <p:sp>
-        <p:nvSpPr>
-          <p:cNvPr id="3" name="Segnaposto contenuto 2">
-            <a:extLst>
-              <a:ext uri="{FF2B5EF4-FFF2-40B4-BE49-F238E27FC236}">
-                <a16:creationId xmlns:a16="http://schemas.microsoft.com/office/drawing/2014/main" id="{764C7403-3324-7F4A-4577-B206B79B93C0}"/>
-              </a:ext>
-            </a:extLst>
-          </p:cNvPr>
-          <p:cNvSpPr>
-            <a:spLocks noGrp="1"/>
-          </p:cNvSpPr>
-          <p:nvPr>
-            <p:ph idx="1"/>
-          </p:nvPr>
-        </p:nvSpPr>
-        <p:spPr/>
-        <p:txBody>
-          <a:bodyPr/>
-          <a:lstStyle/>
-          <a:p>
-            <a:endParaRPr lang="it-IT"/>
-          </a:p>
-        </p:txBody>
-      </p:sp>
+          <p:cNvPr id="14" name="CasellaDiTesto 13">
+            <a:extLst>
+              <a:ext uri="{FF2B5EF4-FFF2-40B4-BE49-F238E27FC236}">
+                <a16:creationId xmlns:a16="http://schemas.microsoft.com/office/drawing/2014/main" id="{D2C30B4A-1376-CF5E-5B62-6B1E6FF00598}"/>
+              </a:ext>
+            </a:extLst>
+          </p:cNvPr>
+          <p:cNvSpPr txBox="1"/>
+          <p:nvPr/>
+        </p:nvSpPr>
+        <p:spPr>
+          <a:xfrm>
+            <a:off x="586451" y="589920"/>
+            <a:ext cx="5660020" cy="1200329"/>
+          </a:xfrm>
+          <a:prstGeom prst="rect">
+            <a:avLst/>
+          </a:prstGeom>
+          <a:noFill/>
+        </p:spPr>
+        <p:txBody>
+          <a:bodyPr wrap="square" rtlCol="0">
+            <a:spAutoFit/>
+          </a:bodyPr>
+          <a:lstStyle/>
+          <a:p>
+            <a:r>
+              <a:rPr lang="it-IT" sz="2400" dirty="0">
+                <a:solidFill>
+                  <a:schemeClr val="bg1"/>
+                </a:solidFill>
+                <a:latin typeface="Consolas" panose="020B0609020204030204" pitchFamily="49" charset="0"/>
+              </a:rPr>
+              <a:t>Il primo giorno è stato dedicato ad una provvisoria suddivisione dei ruoli del gruppo.</a:t>
+            </a:r>
+          </a:p>
+        </p:txBody>
+      </p:sp>
+      <p:sp>
+        <p:nvSpPr>
+          <p:cNvPr id="15" name="CasellaDiTesto 14">
+            <a:extLst>
+              <a:ext uri="{FF2B5EF4-FFF2-40B4-BE49-F238E27FC236}">
+                <a16:creationId xmlns:a16="http://schemas.microsoft.com/office/drawing/2014/main" id="{049C9921-1D1C-50F6-783E-BC7EC3CD42AD}"/>
+              </a:ext>
+            </a:extLst>
+          </p:cNvPr>
+          <p:cNvSpPr txBox="1"/>
+          <p:nvPr/>
+        </p:nvSpPr>
+        <p:spPr>
+          <a:xfrm>
+            <a:off x="586451" y="2204199"/>
+            <a:ext cx="9294472" cy="1477328"/>
+          </a:xfrm>
+          <a:prstGeom prst="rect">
+            <a:avLst/>
+          </a:prstGeom>
+          <a:noFill/>
+        </p:spPr>
+        <p:txBody>
+          <a:bodyPr wrap="square" rtlCol="0">
+            <a:spAutoFit/>
+          </a:bodyPr>
+          <a:lstStyle/>
+          <a:p>
+            <a:r>
+              <a:rPr lang="it-IT" dirty="0">
+                <a:solidFill>
+                  <a:schemeClr val="bg1"/>
+                </a:solidFill>
+                <a:latin typeface="Consolas" panose="020B0609020204030204" pitchFamily="49" charset="0"/>
+              </a:rPr>
+              <a:t>Il secondo giorno è stata finalizzata la suddivisione dei ruoli del gruppo e sono stati svolti:</a:t>
+            </a:r>
+          </a:p>
+          <a:p>
+            <a:pPr marL="285750" indent="-285750">
+              <a:buFont typeface="Arial" panose="020B0604020202020204" pitchFamily="34" charset="0"/>
+              <a:buChar char="•"/>
+            </a:pPr>
+            <a:r>
+              <a:rPr lang="it-IT" dirty="0">
+                <a:solidFill>
+                  <a:schemeClr val="bg1"/>
+                </a:solidFill>
+                <a:latin typeface="Consolas" panose="020B0609020204030204" pitchFamily="49" charset="0"/>
+              </a:rPr>
+              <a:t>lo Sprint Planning;</a:t>
+            </a:r>
+          </a:p>
+          <a:p>
+            <a:pPr marL="285750" indent="-285750">
+              <a:buFont typeface="Arial" panose="020B0604020202020204" pitchFamily="34" charset="0"/>
+              <a:buChar char="•"/>
+            </a:pPr>
+            <a:r>
+              <a:rPr lang="it-IT" dirty="0">
+                <a:solidFill>
+                  <a:schemeClr val="bg1"/>
+                </a:solidFill>
+                <a:latin typeface="Consolas" panose="020B0609020204030204" pitchFamily="49" charset="0"/>
+              </a:rPr>
+              <a:t>un brain storming per capire come realizzare il programma;</a:t>
+            </a:r>
+          </a:p>
+          <a:p>
+            <a:pPr marL="285750" indent="-285750">
+              <a:buFont typeface="Arial" panose="020B0604020202020204" pitchFamily="34" charset="0"/>
+              <a:buChar char="•"/>
+            </a:pPr>
+            <a:r>
+              <a:rPr lang="it-IT" dirty="0">
+                <a:solidFill>
+                  <a:schemeClr val="bg1"/>
+                </a:solidFill>
+                <a:latin typeface="Consolas" panose="020B0609020204030204" pitchFamily="49" charset="0"/>
+              </a:rPr>
+              <a:t>...</a:t>
+            </a:r>
+          </a:p>
+        </p:txBody>
+      </p:sp>
+      <p:pic>
+        <p:nvPicPr>
+          <p:cNvPr id="16" name="Immagine 15">
+            <a:extLst>
+              <a:ext uri="{FF2B5EF4-FFF2-40B4-BE49-F238E27FC236}">
+                <a16:creationId xmlns:a16="http://schemas.microsoft.com/office/drawing/2014/main" id="{5DFA96EF-7FDF-4B65-9892-2237E26B372A}"/>
+              </a:ext>
+            </a:extLst>
+          </p:cNvPr>
+          <p:cNvPicPr>
+            <a:picLocks noChangeAspect="1"/>
+          </p:cNvPicPr>
+          <p:nvPr/>
+        </p:nvPicPr>
+        <p:blipFill>
+          <a:blip r:embed="rId2">
+            <a:extLst>
+              <a:ext uri="{28A0092B-C50C-407E-A947-70E740481C1C}">
+                <a14:useLocalDpi xmlns:a14="http://schemas.microsoft.com/office/drawing/2010/main" val="0"/>
+              </a:ext>
+            </a:extLst>
+          </a:blip>
+          <a:stretch>
+            <a:fillRect/>
+          </a:stretch>
+        </p:blipFill>
+        <p:spPr>
+          <a:xfrm>
+            <a:off x="7546692" y="3959848"/>
+            <a:ext cx="3879054" cy="2181967"/>
+          </a:xfrm>
+          <a:prstGeom prst="rect">
+            <a:avLst/>
+          </a:prstGeom>
+        </p:spPr>
+      </p:pic>
     </p:spTree>
     <p:extLst>
       <p:ext uri="{BB962C8B-B14F-4D97-AF65-F5344CB8AC3E}">
@@ -3479,6 +3588,14 @@
 <file path=ppt/slides/slide3.xml><?xml version="1.0" encoding="utf-8"?>
 <p:sld xmlns:a="http://schemas.openxmlformats.org/drawingml/2006/main" xmlns:r="http://schemas.openxmlformats.org/officeDocument/2006/relationships" xmlns:p="http://schemas.openxmlformats.org/presentationml/2006/main">
   <p:cSld>
+    <p:bg>
+      <p:bgPr>
+        <a:solidFill>
+          <a:srgbClr val="0C0C0C"/>
+        </a:solidFill>
+        <a:effectLst/>
+      </p:bgPr>
+    </p:bg>
     <p:spTree>
       <p:nvGrpSpPr>
         <p:cNvPr id="1" name=""/>
@@ -3493,60 +3610,158 @@
           <a:chExt cx="0" cy="0"/>
         </a:xfrm>
       </p:grpSpPr>
-      <p:sp>
-        <p:nvSpPr>
-          <p:cNvPr id="2" name="Titolo 1">
-            <a:extLst>
-              <a:ext uri="{FF2B5EF4-FFF2-40B4-BE49-F238E27FC236}">
-                <a16:creationId xmlns:a16="http://schemas.microsoft.com/office/drawing/2014/main" id="{ED70473E-466E-9393-9899-495890580DD6}"/>
-              </a:ext>
-            </a:extLst>
-          </p:cNvPr>
-          <p:cNvSpPr>
-            <a:spLocks noGrp="1"/>
-          </p:cNvSpPr>
-          <p:nvPr>
-            <p:ph type="title"/>
-          </p:nvPr>
-        </p:nvSpPr>
-        <p:spPr/>
-        <p:txBody>
-          <a:bodyPr/>
-          <a:lstStyle/>
-          <a:p>
-            <a:endParaRPr lang="it-IT"/>
-          </a:p>
-        </p:txBody>
-      </p:sp>
-      <p:sp>
-        <p:nvSpPr>
-          <p:cNvPr id="3" name="Segnaposto contenuto 2">
-            <a:extLst>
-              <a:ext uri="{FF2B5EF4-FFF2-40B4-BE49-F238E27FC236}">
-                <a16:creationId xmlns:a16="http://schemas.microsoft.com/office/drawing/2014/main" id="{854E63FE-A31D-6FB2-FC10-6F506EC37569}"/>
-              </a:ext>
-            </a:extLst>
-          </p:cNvPr>
-          <p:cNvSpPr>
-            <a:spLocks noGrp="1"/>
-          </p:cNvSpPr>
-          <p:nvPr>
-            <p:ph idx="1"/>
-          </p:nvPr>
-        </p:nvSpPr>
-        <p:spPr/>
-        <p:txBody>
-          <a:bodyPr/>
-          <a:lstStyle/>
-          <a:p>
-            <a:endParaRPr lang="it-IT"/>
-          </a:p>
-        </p:txBody>
-      </p:sp>
+      <p:pic>
+        <p:nvPicPr>
+          <p:cNvPr id="6" name="Immagine 5">
+            <a:extLst>
+              <a:ext uri="{FF2B5EF4-FFF2-40B4-BE49-F238E27FC236}">
+                <a16:creationId xmlns:a16="http://schemas.microsoft.com/office/drawing/2014/main" id="{B63A58CF-0730-CA3F-0928-263C9F78CA8D}"/>
+              </a:ext>
+            </a:extLst>
+          </p:cNvPr>
+          <p:cNvPicPr>
+            <a:picLocks noChangeAspect="1"/>
+          </p:cNvPicPr>
+          <p:nvPr/>
+        </p:nvPicPr>
+        <p:blipFill>
+          <a:blip r:embed="rId2">
+            <a:extLst>
+              <a:ext uri="{28A0092B-C50C-407E-A947-70E740481C1C}">
+                <a14:useLocalDpi xmlns:a14="http://schemas.microsoft.com/office/drawing/2010/main" val="0"/>
+              </a:ext>
+            </a:extLst>
+          </a:blip>
+          <a:stretch>
+            <a:fillRect/>
+          </a:stretch>
+        </p:blipFill>
+        <p:spPr>
+          <a:xfrm>
+            <a:off x="2293926" y="729204"/>
+            <a:ext cx="9135230" cy="5131564"/>
+          </a:xfrm>
+          <a:prstGeom prst="rect">
+            <a:avLst/>
+          </a:prstGeom>
+        </p:spPr>
+      </p:pic>
     </p:spTree>
     <p:extLst>
       <p:ext uri="{BB962C8B-B14F-4D97-AF65-F5344CB8AC3E}">
-        <p14:creationId xmlns:p14="http://schemas.microsoft.com/office/powerpoint/2010/main" val="1577433998"/>
+        <p14:creationId xmlns:p14="http://schemas.microsoft.com/office/powerpoint/2010/main" val="1607188579"/>
+      </p:ext>
+    </p:extLst>
+  </p:cSld>
+  <p:clrMapOvr>
+    <a:masterClrMapping/>
+  </p:clrMapOvr>
+</p:sld>
+</file>
+
+<file path=ppt/slides/slide4.xml><?xml version="1.0" encoding="utf-8"?>
+<p:sld xmlns:a="http://schemas.openxmlformats.org/drawingml/2006/main" xmlns:r="http://schemas.openxmlformats.org/officeDocument/2006/relationships" xmlns:p="http://schemas.openxmlformats.org/presentationml/2006/main">
+  <p:cSld>
+    <p:bg>
+      <p:bgPr>
+        <a:solidFill>
+          <a:srgbClr val="0C0C0C"/>
+        </a:solidFill>
+        <a:effectLst/>
+      </p:bgPr>
+    </p:bg>
+    <p:spTree>
+      <p:nvGrpSpPr>
+        <p:cNvPr id="1" name=""/>
+        <p:cNvGrpSpPr/>
+        <p:nvPr/>
+      </p:nvGrpSpPr>
+      <p:grpSpPr>
+        <a:xfrm>
+          <a:off x="0" y="0"/>
+          <a:ext cx="0" cy="0"/>
+          <a:chOff x="0" y="0"/>
+          <a:chExt cx="0" cy="0"/>
+        </a:xfrm>
+      </p:grpSpPr>
+      <p:pic>
+        <p:nvPicPr>
+          <p:cNvPr id="5" name="Immagine 4">
+            <a:extLst>
+              <a:ext uri="{FF2B5EF4-FFF2-40B4-BE49-F238E27FC236}">
+                <a16:creationId xmlns:a16="http://schemas.microsoft.com/office/drawing/2014/main" id="{FA4FA183-1BA8-50DE-FEB1-D47CF594B2F5}"/>
+              </a:ext>
+            </a:extLst>
+          </p:cNvPr>
+          <p:cNvPicPr>
+            <a:picLocks noChangeAspect="1"/>
+          </p:cNvPicPr>
+          <p:nvPr/>
+        </p:nvPicPr>
+        <p:blipFill>
+          <a:blip r:embed="rId2">
+            <a:extLst>
+              <a:ext uri="{28A0092B-C50C-407E-A947-70E740481C1C}">
+                <a14:useLocalDpi xmlns:a14="http://schemas.microsoft.com/office/drawing/2010/main" val="0"/>
+              </a:ext>
+            </a:extLst>
+          </a:blip>
+          <a:stretch>
+            <a:fillRect/>
+          </a:stretch>
+        </p:blipFill>
+        <p:spPr>
+          <a:xfrm>
+            <a:off x="6114579" y="670861"/>
+            <a:ext cx="3967683" cy="5722764"/>
+          </a:xfrm>
+          <a:prstGeom prst="rect">
+            <a:avLst/>
+          </a:prstGeom>
+        </p:spPr>
+      </p:pic>
+    </p:spTree>
+    <p:extLst>
+      <p:ext uri="{BB962C8B-B14F-4D97-AF65-F5344CB8AC3E}">
+        <p14:creationId xmlns:p14="http://schemas.microsoft.com/office/powerpoint/2010/main" val="2356838351"/>
+      </p:ext>
+    </p:extLst>
+  </p:cSld>
+  <p:clrMapOvr>
+    <a:masterClrMapping/>
+  </p:clrMapOvr>
+</p:sld>
+</file>
+
+<file path=ppt/slides/slide5.xml><?xml version="1.0" encoding="utf-8"?>
+<p:sld xmlns:a="http://schemas.openxmlformats.org/drawingml/2006/main" xmlns:r="http://schemas.openxmlformats.org/officeDocument/2006/relationships" xmlns:p="http://schemas.openxmlformats.org/presentationml/2006/main">
+  <p:cSld>
+    <p:bg>
+      <p:bgPr>
+        <a:solidFill>
+          <a:srgbClr val="0C0C0C"/>
+        </a:solidFill>
+        <a:effectLst/>
+      </p:bgPr>
+    </p:bg>
+    <p:spTree>
+      <p:nvGrpSpPr>
+        <p:cNvPr id="1" name=""/>
+        <p:cNvGrpSpPr/>
+        <p:nvPr/>
+      </p:nvGrpSpPr>
+      <p:grpSpPr>
+        <a:xfrm>
+          <a:off x="0" y="0"/>
+          <a:ext cx="0" cy="0"/>
+          <a:chOff x="0" y="0"/>
+          <a:chExt cx="0" cy="0"/>
+        </a:xfrm>
+      </p:grpSpPr>
+    </p:spTree>
+    <p:extLst>
+      <p:ext uri="{BB962C8B-B14F-4D97-AF65-F5344CB8AC3E}">
+        <p14:creationId xmlns:p14="http://schemas.microsoft.com/office/powerpoint/2010/main" val="315238036"/>
       </p:ext>
     </p:extLst>
   </p:cSld>

</xml_diff>